<commit_message>
Update Introducción a Blazor Web Apps.pptx
</commit_message>
<xml_diff>
--- a/11) ASP, Razor, Blazor & MVC/Introducción a Blazor Web Apps.pptx
+++ b/11) ASP, Razor, Blazor & MVC/Introducción a Blazor Web Apps.pptx
@@ -5,10 +5,10 @@
     <p:sldMasterId id="2147483684" r:id="rId4"/>
   </p:sldMasterIdLst>
   <p:notesMasterIdLst>
-    <p:notesMasterId r:id="rId18"/>
+    <p:notesMasterId r:id="rId19"/>
   </p:notesMasterIdLst>
   <p:handoutMasterIdLst>
-    <p:handoutMasterId r:id="rId19"/>
+    <p:handoutMasterId r:id="rId20"/>
   </p:handoutMasterIdLst>
   <p:sldIdLst>
     <p:sldId id="278" r:id="rId5"/>
@@ -23,7 +23,8 @@
     <p:sldId id="299" r:id="rId14"/>
     <p:sldId id="298" r:id="rId15"/>
     <p:sldId id="300" r:id="rId16"/>
-    <p:sldId id="292" r:id="rId17"/>
+    <p:sldId id="301" r:id="rId17"/>
+    <p:sldId id="292" r:id="rId18"/>
   </p:sldIdLst>
   <p:sldSz cx="12192000" cy="6858000"/>
   <p:notesSz cx="6858000" cy="9144000"/>
@@ -1153,6 +1154,100 @@
             <a:fld id="{E7AF00E9-A49D-4007-B3B9-A3783809E505}" type="slidenum">
               <a:rPr lang="es-ES" smtClean="0"/>
               <a:t>13</a:t>
+            </a:fld>
+            <a:endParaRPr lang="es-ES" dirty="0"/>
+          </a:p>
+        </p:txBody>
+      </p:sp>
+    </p:spTree>
+    <p:extLst>
+      <p:ext uri="{BB962C8B-B14F-4D97-AF65-F5344CB8AC3E}">
+        <p14:creationId xmlns:p14="http://schemas.microsoft.com/office/powerpoint/2010/main" val="1075933489"/>
+      </p:ext>
+    </p:extLst>
+  </p:cSld>
+  <p:clrMapOvr>
+    <a:masterClrMapping/>
+  </p:clrMapOvr>
+</p:notes>
+</file>
+
+<file path=ppt/notesSlides/notesSlide14.xml><?xml version="1.0" encoding="utf-8"?>
+<p:notes xmlns:a="http://schemas.openxmlformats.org/drawingml/2006/main" xmlns:r="http://schemas.openxmlformats.org/officeDocument/2006/relationships" xmlns:p="http://schemas.openxmlformats.org/presentationml/2006/main">
+  <p:cSld>
+    <p:spTree>
+      <p:nvGrpSpPr>
+        <p:cNvPr id="1" name=""/>
+        <p:cNvGrpSpPr/>
+        <p:nvPr/>
+      </p:nvGrpSpPr>
+      <p:grpSpPr>
+        <a:xfrm>
+          <a:off x="0" y="0"/>
+          <a:ext cx="0" cy="0"/>
+          <a:chOff x="0" y="0"/>
+          <a:chExt cx="0" cy="0"/>
+        </a:xfrm>
+      </p:grpSpPr>
+      <p:sp>
+        <p:nvSpPr>
+          <p:cNvPr id="2" name="Marcador de imagen de diapositiva 1"/>
+          <p:cNvSpPr>
+            <a:spLocks noGrp="1" noRot="1" noChangeAspect="1"/>
+          </p:cNvSpPr>
+          <p:nvPr>
+            <p:ph type="sldImg"/>
+          </p:nvPr>
+        </p:nvSpPr>
+        <p:spPr/>
+      </p:sp>
+      <p:sp>
+        <p:nvSpPr>
+          <p:cNvPr id="3" name="Marcador de notas 2"/>
+          <p:cNvSpPr>
+            <a:spLocks noGrp="1"/>
+          </p:cNvSpPr>
+          <p:nvPr>
+            <p:ph type="body" idx="1"/>
+          </p:nvPr>
+        </p:nvSpPr>
+        <p:spPr/>
+        <p:txBody>
+          <a:bodyPr rtlCol="0"/>
+          <a:lstStyle>
+            <a:defPPr>
+              <a:defRPr lang="es-ES"/>
+            </a:defPPr>
+          </a:lstStyle>
+          <a:p>
+            <a:pPr rtl="0"/>
+            <a:endParaRPr lang="es-ES" dirty="0"/>
+          </a:p>
+        </p:txBody>
+      </p:sp>
+      <p:sp>
+        <p:nvSpPr>
+          <p:cNvPr id="4" name="Marcador de número de diapositiva 3"/>
+          <p:cNvSpPr>
+            <a:spLocks noGrp="1"/>
+          </p:cNvSpPr>
+          <p:nvPr>
+            <p:ph type="sldNum" sz="quarter" idx="5"/>
+          </p:nvPr>
+        </p:nvSpPr>
+        <p:spPr/>
+        <p:txBody>
+          <a:bodyPr rtlCol="0"/>
+          <a:lstStyle>
+            <a:defPPr>
+              <a:defRPr lang="es-ES"/>
+            </a:defPPr>
+          </a:lstStyle>
+          <a:p>
+            <a:pPr rtl="0"/>
+            <a:fld id="{E7AF00E9-A49D-4007-B3B9-A3783809E505}" type="slidenum">
+              <a:rPr lang="es-ES" smtClean="0"/>
+              <a:t>14</a:t>
             </a:fld>
             <a:endParaRPr lang="es-ES" dirty="0"/>
           </a:p>
@@ -12580,7 +12675,7 @@
         <p:spPr>
           <a:xfrm>
             <a:off x="160717" y="4581659"/>
-            <a:ext cx="9646674" cy="1477328"/>
+            <a:ext cx="9646674" cy="923330"/>
           </a:xfrm>
           <a:prstGeom prst="rect">
             <a:avLst/>
@@ -12626,40 +12721,6 @@
             </a:endParaRPr>
           </a:p>
           <a:p>
-            <a:r>
-              <a:rPr lang="es-CR" dirty="0" err="1"/>
-              <a:t>dotnet</a:t>
-            </a:r>
-            <a:r>
-              <a:rPr lang="es-CR" dirty="0"/>
-              <a:t> </a:t>
-            </a:r>
-            <a:r>
-              <a:rPr lang="es-CR" dirty="0" err="1"/>
-              <a:t>build</a:t>
-            </a:r>
-            <a:r>
-              <a:rPr lang="es-CR" dirty="0"/>
-              <a:t> </a:t>
-            </a:r>
-            <a:r>
-              <a:rPr lang="es-CR" b="1" dirty="0">
-                <a:solidFill>
-                  <a:srgbClr val="FFFF00"/>
-                </a:solidFill>
-              </a:rPr>
-              <a:t>(Para compilar el app)</a:t>
-            </a:r>
-            <a:br>
-              <a:rPr lang="es-CR" b="1" dirty="0">
-                <a:solidFill>
-                  <a:srgbClr val="FFFF00"/>
-                </a:solidFill>
-              </a:rPr>
-            </a:br>
-            <a:br>
-              <a:rPr lang="es-CR" dirty="0"/>
-            </a:br>
             <a:r>
               <a:rPr lang="es-CR" dirty="0" err="1"/>
               <a:t>dotnet</a:t>
@@ -12876,6 +12937,254 @@
 </file>
 
 <file path=ppt/slides/slide13.xml><?xml version="1.0" encoding="utf-8"?>
+<p:sld xmlns:a="http://schemas.openxmlformats.org/drawingml/2006/main" xmlns:r="http://schemas.openxmlformats.org/officeDocument/2006/relationships" xmlns:p="http://schemas.openxmlformats.org/presentationml/2006/main">
+  <p:cSld>
+    <p:spTree>
+      <p:nvGrpSpPr>
+        <p:cNvPr id="1" name=""/>
+        <p:cNvGrpSpPr/>
+        <p:nvPr/>
+      </p:nvGrpSpPr>
+      <p:grpSpPr>
+        <a:xfrm>
+          <a:off x="0" y="0"/>
+          <a:ext cx="0" cy="0"/>
+          <a:chOff x="0" y="0"/>
+          <a:chExt cx="0" cy="0"/>
+        </a:xfrm>
+      </p:grpSpPr>
+      <p:sp>
+        <p:nvSpPr>
+          <p:cNvPr id="11" name="Título 1">
+            <a:extLst>
+              <a:ext uri="{FF2B5EF4-FFF2-40B4-BE49-F238E27FC236}">
+                <a16:creationId xmlns:a16="http://schemas.microsoft.com/office/drawing/2014/main" id="{80BBC19E-9D06-FB38-F474-D18C6EC253F1}"/>
+              </a:ext>
+            </a:extLst>
+          </p:cNvPr>
+          <p:cNvSpPr txBox="1">
+            <a:spLocks/>
+          </p:cNvSpPr>
+          <p:nvPr/>
+        </p:nvSpPr>
+        <p:spPr>
+          <a:xfrm>
+            <a:off x="550862" y="353960"/>
+            <a:ext cx="11090275" cy="609601"/>
+          </a:xfrm>
+          <a:prstGeom prst="rect">
+            <a:avLst/>
+          </a:prstGeom>
+        </p:spPr>
+        <p:txBody>
+          <a:bodyPr vert="horz" wrap="square" lIns="91440" tIns="0" rIns="0" bIns="0" rtlCol="0" anchor="b" anchorCtr="0">
+            <a:normAutofit/>
+          </a:bodyPr>
+          <a:lstStyle>
+            <a:defPPr>
+              <a:defRPr lang="es-ES"/>
+            </a:defPPr>
+            <a:lvl1pPr algn="l" defTabSz="914400" rtl="0" eaLnBrk="1" latinLnBrk="0" hangingPunct="1">
+              <a:lnSpc>
+                <a:spcPct val="90000"/>
+              </a:lnSpc>
+              <a:spcBef>
+                <a:spcPct val="0"/>
+              </a:spcBef>
+              <a:buNone/>
+              <a:defRPr lang="es-ES" sz="4000" kern="1200">
+                <a:solidFill>
+                  <a:schemeClr val="tx1"/>
+                </a:solidFill>
+                <a:latin typeface="+mj-lt"/>
+                <a:ea typeface="+mj-ea"/>
+                <a:cs typeface="+mj-cs"/>
+              </a:defRPr>
+            </a:lvl1pPr>
+          </a:lstStyle>
+          <a:p>
+            <a:r>
+              <a:rPr lang="es-MX" dirty="0"/>
+              <a:t>Ejecutar la </a:t>
+            </a:r>
+            <a:r>
+              <a:rPr lang="es-MX" dirty="0" err="1"/>
+              <a:t>Blazor</a:t>
+            </a:r>
+            <a:r>
+              <a:rPr lang="es-MX" dirty="0"/>
+              <a:t> Web App en VS </a:t>
+            </a:r>
+            <a:r>
+              <a:rPr lang="es-MX" dirty="0" err="1"/>
+              <a:t>Code</a:t>
+            </a:r>
+            <a:endParaRPr lang="es-MX" dirty="0"/>
+          </a:p>
+        </p:txBody>
+      </p:sp>
+      <p:pic>
+        <p:nvPicPr>
+          <p:cNvPr id="3" name="Imagen 2">
+            <a:extLst>
+              <a:ext uri="{FF2B5EF4-FFF2-40B4-BE49-F238E27FC236}">
+                <a16:creationId xmlns:a16="http://schemas.microsoft.com/office/drawing/2014/main" id="{1332573F-F16F-2886-B437-2912C6EF39F7}"/>
+              </a:ext>
+            </a:extLst>
+          </p:cNvPr>
+          <p:cNvPicPr>
+            <a:picLocks noChangeAspect="1"/>
+          </p:cNvPicPr>
+          <p:nvPr/>
+        </p:nvPicPr>
+        <p:blipFill>
+          <a:blip r:embed="rId3"/>
+          <a:stretch>
+            <a:fillRect/>
+          </a:stretch>
+        </p:blipFill>
+        <p:spPr>
+          <a:xfrm>
+            <a:off x="550862" y="1326839"/>
+            <a:ext cx="5938428" cy="2102161"/>
+          </a:xfrm>
+          <a:prstGeom prst="rect">
+            <a:avLst/>
+          </a:prstGeom>
+        </p:spPr>
+      </p:pic>
+      <p:sp>
+        <p:nvSpPr>
+          <p:cNvPr id="10" name="CuadroTexto 9">
+            <a:extLst>
+              <a:ext uri="{FF2B5EF4-FFF2-40B4-BE49-F238E27FC236}">
+                <a16:creationId xmlns:a16="http://schemas.microsoft.com/office/drawing/2014/main" id="{118E660A-0804-5CC8-3A40-B52D5ED32CEA}"/>
+              </a:ext>
+            </a:extLst>
+          </p:cNvPr>
+          <p:cNvSpPr txBox="1"/>
+          <p:nvPr/>
+        </p:nvSpPr>
+        <p:spPr>
+          <a:xfrm>
+            <a:off x="6794091" y="2005420"/>
+            <a:ext cx="5078074" cy="1200329"/>
+          </a:xfrm>
+          <a:prstGeom prst="rect">
+            <a:avLst/>
+          </a:prstGeom>
+          <a:noFill/>
+        </p:spPr>
+        <p:txBody>
+          <a:bodyPr wrap="square">
+            <a:spAutoFit/>
+          </a:bodyPr>
+          <a:lstStyle/>
+          <a:p>
+            <a:r>
+              <a:rPr lang="es-CR" dirty="0" err="1"/>
+              <a:t>dotnet</a:t>
+            </a:r>
+            <a:r>
+              <a:rPr lang="es-CR" dirty="0"/>
+              <a:t> </a:t>
+            </a:r>
+            <a:r>
+              <a:rPr lang="es-CR" dirty="0" err="1"/>
+              <a:t>build</a:t>
+            </a:r>
+            <a:r>
+              <a:rPr lang="es-CR"/>
+              <a:t> </a:t>
+            </a:r>
+            <a:r>
+              <a:rPr lang="es-CR" b="1">
+                <a:solidFill>
+                  <a:srgbClr val="FFFF00"/>
+                </a:solidFill>
+              </a:rPr>
+              <a:t>(Para compilar el app)</a:t>
+            </a:r>
+          </a:p>
+          <a:p>
+            <a:endParaRPr lang="es-CR"/>
+          </a:p>
+          <a:p>
+            <a:r>
+              <a:rPr lang="es-CR" dirty="0" err="1"/>
+              <a:t>dotnet</a:t>
+            </a:r>
+            <a:r>
+              <a:rPr lang="es-CR" dirty="0"/>
+              <a:t> run </a:t>
+            </a:r>
+            <a:r>
+              <a:rPr lang="es-CR" b="1" dirty="0">
+                <a:solidFill>
+                  <a:srgbClr val="FFFF00"/>
+                </a:solidFill>
+              </a:rPr>
+              <a:t>(Para ejecutar el app)</a:t>
+            </a:r>
+            <a:br>
+              <a:rPr lang="es-CR" b="1" dirty="0">
+                <a:solidFill>
+                  <a:srgbClr val="FFFF00"/>
+                </a:solidFill>
+              </a:rPr>
+            </a:br>
+            <a:endParaRPr lang="es-CR" b="1" dirty="0">
+              <a:solidFill>
+                <a:srgbClr val="FFFF00"/>
+              </a:solidFill>
+            </a:endParaRPr>
+          </a:p>
+        </p:txBody>
+      </p:sp>
+      <p:pic>
+        <p:nvPicPr>
+          <p:cNvPr id="13" name="Imagen 12">
+            <a:extLst>
+              <a:ext uri="{FF2B5EF4-FFF2-40B4-BE49-F238E27FC236}">
+                <a16:creationId xmlns:a16="http://schemas.microsoft.com/office/drawing/2014/main" id="{E200030A-6DEC-80C4-879B-50D250C91911}"/>
+              </a:ext>
+            </a:extLst>
+          </p:cNvPr>
+          <p:cNvPicPr>
+            <a:picLocks noChangeAspect="1"/>
+          </p:cNvPicPr>
+          <p:nvPr/>
+        </p:nvPicPr>
+        <p:blipFill>
+          <a:blip r:embed="rId4"/>
+          <a:stretch>
+            <a:fillRect/>
+          </a:stretch>
+        </p:blipFill>
+        <p:spPr>
+          <a:xfrm>
+            <a:off x="550862" y="3693610"/>
+            <a:ext cx="11222016" cy="2772162"/>
+          </a:xfrm>
+          <a:prstGeom prst="rect">
+            <a:avLst/>
+          </a:prstGeom>
+        </p:spPr>
+      </p:pic>
+    </p:spTree>
+    <p:extLst>
+      <p:ext uri="{BB962C8B-B14F-4D97-AF65-F5344CB8AC3E}">
+        <p14:creationId xmlns:p14="http://schemas.microsoft.com/office/powerpoint/2010/main" val="2472423998"/>
+      </p:ext>
+    </p:extLst>
+  </p:cSld>
+  <p:clrMapOvr>
+    <a:masterClrMapping/>
+  </p:clrMapOvr>
+</p:sld>
+</file>
+
+<file path=ppt/slides/slide14.xml><?xml version="1.0" encoding="utf-8"?>
 <p:sld xmlns:a="http://schemas.openxmlformats.org/drawingml/2006/main" xmlns:r="http://schemas.openxmlformats.org/officeDocument/2006/relationships" xmlns:p="http://schemas.openxmlformats.org/presentationml/2006/main">
   <p:cSld>
     <p:spTree>

</xml_diff>